<commit_message>
Updated Final Presentation file
Updated the missing slide of Agenda
</commit_message>
<xml_diff>
--- a/QuickBase_CraftDemo_Presentation_SujayGhodke.pptx
+++ b/QuickBase_CraftDemo_Presentation_SujayGhodke.pptx
@@ -1161,63 +1161,6 @@
       </p:sp>
       <p:sp>
         <p:nvSpPr>
-          <p:cNvPr id="3" name="TextBox 2"/>
-          <p:cNvSpPr txBox="1"/>
-          <p:nvPr/>
-        </p:nvSpPr>
-        <p:spPr>
-          <a:xfrm>
-            <a:off x="282223" y="1404184"/>
-            <a:ext cx="8087682" cy="1938992"/>
-          </a:xfrm>
-          <a:prstGeom prst="rect">
-            <a:avLst/>
-          </a:prstGeom>
-          <a:noFill/>
-        </p:spPr>
-        <p:txBody>
-          <a:bodyPr wrap="square" rtlCol="0">
-            <a:spAutoFit/>
-          </a:bodyPr>
-          <a:lstStyle/>
-          <a:p>
-            <a:pPr>
-              <a:lnSpc>
-                <a:spcPct val="120000"/>
-              </a:lnSpc>
-            </a:pPr>
-            <a:r>
-              <a:rPr lang="en-US" sz="2000" b="1" dirty="0">
-                <a:solidFill>
-                  <a:srgbClr val="606060"/>
-                </a:solidFill>
-                <a:latin typeface="Avenir Next Regular"/>
-                <a:cs typeface="Avenir Next Regular"/>
-              </a:rPr>
-              <a:t>We have one hour to get to know each other.</a:t>
-            </a:r>
-          </a:p>
-          <a:p>
-            <a:pPr>
-              <a:lnSpc>
-                <a:spcPct val="120000"/>
-              </a:lnSpc>
-            </a:pPr>
-            <a:r>
-              <a:rPr lang="en-US" sz="2000" b="0" i="0" dirty="0">
-                <a:solidFill>
-                  <a:srgbClr val="606060"/>
-                </a:solidFill>
-                <a:latin typeface="Avenir Next Regular"/>
-                <a:cs typeface="Avenir Next Regular"/>
-              </a:rPr>
-              <a:t>The first part of the interview is designed to generate a conversation. We want to know what is important to you and share what is important to us. Learnings and values are more important than details.</a:t>
-            </a:r>
-          </a:p>
-        </p:txBody>
-      </p:sp>
-      <p:sp>
-        <p:nvSpPr>
           <p:cNvPr id="4" name="Hexagon 3"/>
           <p:cNvSpPr/>
           <p:nvPr/>
@@ -1270,7 +1213,7 @@
         <p:spPr>
           <a:xfrm>
             <a:off x="1910242" y="5293834"/>
-            <a:ext cx="5358996" cy="461665"/>
+            <a:ext cx="5358996" cy="954107"/>
           </a:xfrm>
           <a:prstGeom prst="rect">
             <a:avLst/>
@@ -1289,6 +1232,40 @@
               </a:lnSpc>
             </a:pPr>
             <a:r>
+              <a:rPr lang="en-US" sz="1600" b="1" dirty="0">
+                <a:solidFill>
+                  <a:schemeClr val="bg1"/>
+                </a:solidFill>
+                <a:latin typeface="Avenir Next Regular"/>
+                <a:cs typeface="Avenir Next Regular"/>
+              </a:rPr>
+              <a:t>“Conversation is a catalyst for innovation.”</a:t>
+            </a:r>
+          </a:p>
+          <a:p>
+            <a:pPr algn="ctr">
+              <a:lnSpc>
+                <a:spcPct val="120000"/>
+              </a:lnSpc>
+            </a:pPr>
+            <a:r>
+              <a:rPr lang="en-US" sz="1200" b="1" dirty="0">
+                <a:solidFill>
+                  <a:schemeClr val="bg1"/>
+                </a:solidFill>
+                <a:latin typeface="Avenir Next Regular"/>
+                <a:cs typeface="Avenir Next Regular"/>
+              </a:rPr>
+              <a:t>- John Seely Brown</a:t>
+            </a:r>
+          </a:p>
+          <a:p>
+            <a:pPr algn="ctr">
+              <a:lnSpc>
+                <a:spcPct val="120000"/>
+              </a:lnSpc>
+            </a:pPr>
+            <a:r>
               <a:rPr lang="en-US" sz="2000" b="1" dirty="0">
                 <a:solidFill>
                   <a:schemeClr val="bg1"/>
@@ -1296,7 +1273,7 @@
                 <a:latin typeface="Avenir Next Regular"/>
                 <a:cs typeface="Avenir Next Regular"/>
               </a:rPr>
-              <a:t>The goal is to have a great conversation.</a:t>
+              <a:t>.</a:t>
             </a:r>
           </a:p>
         </p:txBody>
@@ -1309,8 +1286,8 @@
         </p:nvSpPr>
         <p:spPr>
           <a:xfrm>
-            <a:off x="282223" y="3343176"/>
-            <a:ext cx="2613377" cy="867930"/>
+            <a:off x="411238" y="2448873"/>
+            <a:ext cx="2613377" cy="1115690"/>
           </a:xfrm>
           <a:prstGeom prst="rect">
             <a:avLst/>
@@ -1323,7 +1300,7 @@
           </a:bodyPr>
           <a:lstStyle/>
           <a:p>
-            <a:pPr>
+            <a:pPr algn="ctr">
               <a:lnSpc>
                 <a:spcPct val="120000"/>
               </a:lnSpc>
@@ -1336,8 +1313,15 @@
                 <a:latin typeface="Avenir Next Italic"/>
                 <a:cs typeface="Avenir Next Italic"/>
               </a:rPr>
-              <a:t>About Me </a:t>
-            </a:r>
+              <a:t>About Me</a:t>
+            </a:r>
+          </a:p>
+          <a:p>
+            <a:pPr algn="ctr">
+              <a:lnSpc>
+                <a:spcPct val="120000"/>
+              </a:lnSpc>
+            </a:pPr>
             <a:r>
               <a:rPr lang="en-US" sz="1400" dirty="0">
                 <a:solidFill>
@@ -1346,7 +1330,7 @@
                 <a:latin typeface="Avenir Next Italic"/>
                 <a:cs typeface="Avenir Next Italic"/>
               </a:rPr>
-              <a:t>Roughly 5 minutes to tell us about yourself and set some context.</a:t>
+              <a:t>My background and experiences in the world of technology.</a:t>
             </a:r>
           </a:p>
         </p:txBody>
@@ -1359,8 +1343,8 @@
         </p:nvSpPr>
         <p:spPr>
           <a:xfrm>
-            <a:off x="3031070" y="3343176"/>
-            <a:ext cx="2613377" cy="1126462"/>
+            <a:off x="3160085" y="2448873"/>
+            <a:ext cx="2613377" cy="1374222"/>
           </a:xfrm>
           <a:prstGeom prst="rect">
             <a:avLst/>
@@ -1373,7 +1357,7 @@
           </a:bodyPr>
           <a:lstStyle/>
           <a:p>
-            <a:pPr>
+            <a:pPr algn="ctr">
               <a:lnSpc>
                 <a:spcPct val="120000"/>
               </a:lnSpc>
@@ -1396,7 +1380,24 @@
                 <a:latin typeface="Avenir Next Italic"/>
                 <a:cs typeface="Avenir Next Italic"/>
               </a:rPr>
-              <a:t>Showcase one or two career highlights. We should spend about 5 minutes on each. </a:t>
+              <a:t>A glimpse of two of my recent technology projects.</a:t>
+            </a:r>
+          </a:p>
+          <a:p>
+            <a:pPr algn="ctr">
+              <a:lnSpc>
+                <a:spcPct val="120000"/>
+              </a:lnSpc>
+            </a:pPr>
+            <a:r>
+              <a:rPr lang="en-US" sz="1400" dirty="0">
+                <a:solidFill>
+                  <a:srgbClr val="606060"/>
+                </a:solidFill>
+                <a:latin typeface="Avenir Next Italic"/>
+                <a:cs typeface="Avenir Next Italic"/>
+              </a:rPr>
+              <a:t>The intent behind building them and learnings. </a:t>
             </a:r>
           </a:p>
         </p:txBody>
@@ -1409,8 +1410,8 @@
         </p:nvSpPr>
         <p:spPr>
           <a:xfrm>
-            <a:off x="5813777" y="3343176"/>
-            <a:ext cx="2613377" cy="1384995"/>
+            <a:off x="5942792" y="2448873"/>
+            <a:ext cx="2613377" cy="857158"/>
           </a:xfrm>
           <a:prstGeom prst="rect">
             <a:avLst/>
@@ -1423,7 +1424,7 @@
           </a:bodyPr>
           <a:lstStyle/>
           <a:p>
-            <a:pPr>
+            <a:pPr algn="ctr">
               <a:lnSpc>
                 <a:spcPct val="120000"/>
               </a:lnSpc>
@@ -1438,6 +1439,20 @@
               </a:rPr>
               <a:t>Craft Demo </a:t>
             </a:r>
+            <a:endParaRPr lang="en-US" sz="1400" dirty="0">
+              <a:solidFill>
+                <a:srgbClr val="606060"/>
+              </a:solidFill>
+              <a:latin typeface="Avenir Next Italic"/>
+              <a:cs typeface="Avenir Next Italic"/>
+            </a:endParaRPr>
+          </a:p>
+          <a:p>
+            <a:pPr algn="ctr">
+              <a:lnSpc>
+                <a:spcPct val="120000"/>
+              </a:lnSpc>
+            </a:pPr>
             <a:r>
               <a:rPr lang="en-US" sz="1400" dirty="0">
                 <a:solidFill>
@@ -1446,7 +1461,7 @@
                 <a:latin typeface="Avenir Next Italic"/>
                 <a:cs typeface="Avenir Next Italic"/>
               </a:rPr>
-              <a:t>You should spend about 15 minutes walking through the demo. The remaining 30 minutes is for discussion.</a:t>
+              <a:t>Demo of what I have built and discussion on how I built it.</a:t>
             </a:r>
           </a:p>
         </p:txBody>
@@ -4037,24 +4052,6 @@
 </file>
 
 <file path=customXml/item1.xml><?xml version="1.0" encoding="utf-8"?>
-<p:properties xmlns:p="http://schemas.microsoft.com/office/2006/metadata/properties" xmlns:xsi="http://www.w3.org/2001/XMLSchema-instance" xmlns:pc="http://schemas.microsoft.com/office/infopath/2007/PartnerControls">
-  <documentManagement>
-    <PublishingExpirationDate xmlns="http://schemas.microsoft.com/sharepoint/v3" xsi:nil="true"/>
-    <PublishingStartDate xmlns="http://schemas.microsoft.com/sharepoint/v3" xsi:nil="true"/>
-  </documentManagement>
-</p:properties>
-</file>
-
-<file path=customXml/item2.xml><?xml version="1.0" encoding="utf-8"?>
-<?mso-contentType ?>
-<FormTemplates xmlns="http://schemas.microsoft.com/sharepoint/v3/contenttype/forms">
-  <Display>DocumentLibraryForm</Display>
-  <Edit>DocumentLibraryForm</Edit>
-  <New>DocumentLibraryForm</New>
-</FormTemplates>
-</file>
-
-<file path=customXml/item3.xml><?xml version="1.0" encoding="utf-8"?>
 <ct:contentTypeSchema xmlns:ct="http://schemas.microsoft.com/office/2006/metadata/contentType" xmlns:ma="http://schemas.microsoft.com/office/2006/metadata/properties/metaAttributes" ct:_="" ma:_="" ma:contentTypeName="Document" ma:contentTypeID="0x0101009713AC2EAA180D48BE9C6C4B9AFDF650" ma:contentTypeVersion="1" ma:contentTypeDescription="Create a new document." ma:contentTypeScope="" ma:versionID="e1ebe21cc30349ae4da8962eed91cfc4">
   <xsd:schema xmlns:xsd="http://www.w3.org/2001/XMLSchema" xmlns:xs="http://www.w3.org/2001/XMLSchema" xmlns:p="http://schemas.microsoft.com/office/2006/metadata/properties" xmlns:ns1="http://schemas.microsoft.com/sharepoint/v3" targetNamespace="http://schemas.microsoft.com/office/2006/metadata/properties" ma:root="true" ma:fieldsID="2292e01370a06b57d65de8bf0b95326f" ns1:_="">
     <xsd:import namespace="http://schemas.microsoft.com/sharepoint/v3"/>
@@ -4186,25 +4183,25 @@
 </ct:contentTypeSchema>
 </file>
 
-<file path=customXml/itemProps1.xml><?xml version="1.0" encoding="utf-8"?>
-<ds:datastoreItem xmlns:ds="http://schemas.openxmlformats.org/officeDocument/2006/customXml" ds:itemID="{DB6C8D68-CAE8-4863-90D6-3B20D5072EB4}">
-  <ds:schemaRefs>
-    <ds:schemaRef ds:uri="http://schemas.microsoft.com/office/2006/metadata/properties"/>
-    <ds:schemaRef ds:uri="http://schemas.microsoft.com/office/infopath/2007/PartnerControls"/>
-    <ds:schemaRef ds:uri="http://schemas.microsoft.com/sharepoint/v3"/>
-  </ds:schemaRefs>
-</ds:datastoreItem>
+<file path=customXml/item2.xml><?xml version="1.0" encoding="utf-8"?>
+<?mso-contentType ?>
+<FormTemplates xmlns="http://schemas.microsoft.com/sharepoint/v3/contenttype/forms">
+  <Display>DocumentLibraryForm</Display>
+  <Edit>DocumentLibraryForm</Edit>
+  <New>DocumentLibraryForm</New>
+</FormTemplates>
 </file>
 
-<file path=customXml/itemProps2.xml><?xml version="1.0" encoding="utf-8"?>
-<ds:datastoreItem xmlns:ds="http://schemas.openxmlformats.org/officeDocument/2006/customXml" ds:itemID="{E0605501-9F6A-4E21-AD29-AC5B45E31C6D}">
-  <ds:schemaRefs>
-    <ds:schemaRef ds:uri="http://schemas.microsoft.com/sharepoint/v3/contenttype/forms"/>
-  </ds:schemaRefs>
-</ds:datastoreItem>
+<file path=customXml/item3.xml><?xml version="1.0" encoding="utf-8"?>
+<p:properties xmlns:p="http://schemas.microsoft.com/office/2006/metadata/properties" xmlns:xsi="http://www.w3.org/2001/XMLSchema-instance" xmlns:pc="http://schemas.microsoft.com/office/infopath/2007/PartnerControls">
+  <documentManagement>
+    <PublishingExpirationDate xmlns="http://schemas.microsoft.com/sharepoint/v3" xsi:nil="true"/>
+    <PublishingStartDate xmlns="http://schemas.microsoft.com/sharepoint/v3" xsi:nil="true"/>
+  </documentManagement>
+</p:properties>
 </file>
 
-<file path=customXml/itemProps3.xml><?xml version="1.0" encoding="utf-8"?>
+<file path=customXml/itemProps1.xml><?xml version="1.0" encoding="utf-8"?>
 <ds:datastoreItem xmlns:ds="http://schemas.openxmlformats.org/officeDocument/2006/customXml" ds:itemID="{282C0678-4C24-4F49-91BA-562B0FB67A62}">
   <ds:schemaRefs>
     <ds:schemaRef ds:uri="http://schemas.microsoft.com/office/2006/metadata/contentType"/>
@@ -4220,4 +4217,22 @@
     <ds:schemaRef ds:uri="http://schemas.microsoft.com/internal/obd"/>
   </ds:schemaRefs>
 </ds:datastoreItem>
+</file>
+
+<file path=customXml/itemProps2.xml><?xml version="1.0" encoding="utf-8"?>
+<ds:datastoreItem xmlns:ds="http://schemas.openxmlformats.org/officeDocument/2006/customXml" ds:itemID="{E0605501-9F6A-4E21-AD29-AC5B45E31C6D}">
+  <ds:schemaRefs>
+    <ds:schemaRef ds:uri="http://schemas.microsoft.com/sharepoint/v3/contenttype/forms"/>
+  </ds:schemaRefs>
+</ds:datastoreItem>
+</file>
+
+<file path=customXml/itemProps3.xml><?xml version="1.0" encoding="utf-8"?>
+<ds:datastoreItem xmlns:ds="http://schemas.openxmlformats.org/officeDocument/2006/customXml" ds:itemID="{DB6C8D68-CAE8-4863-90D6-3B20D5072EB4}">
+  <ds:schemaRefs>
+    <ds:schemaRef ds:uri="http://schemas.microsoft.com/office/2006/metadata/properties"/>
+    <ds:schemaRef ds:uri="http://schemas.microsoft.com/office/infopath/2007/PartnerControls"/>
+    <ds:schemaRef ds:uri="http://schemas.microsoft.com/sharepoint/v3"/>
+  </ds:schemaRefs>
+</ds:datastoreItem>
 </file>
</xml_diff>